<commit_message>
Added CST316 Proposal to Documents
Our first design document turned in for Sprint 1 has been added to the
repository.
</commit_message>
<xml_diff>
--- a/doc/PowerPoints/Sprint 2 Presentation.pptx
+++ b/doc/PowerPoints/Sprint 2 Presentation.pptx
@@ -21,9 +21,9 @@
     <p:sldId id="264" r:id="rId15"/>
     <p:sldId id="265" r:id="rId16"/>
     <p:sldId id="268" r:id="rId17"/>
-    <p:sldId id="271" r:id="rId18"/>
-    <p:sldId id="272" r:id="rId19"/>
-    <p:sldId id="269" r:id="rId20"/>
+    <p:sldId id="269" r:id="rId18"/>
+    <p:sldId id="271" r:id="rId19"/>
+    <p:sldId id="272" r:id="rId20"/>
     <p:sldId id="270" r:id="rId21"/>
   </p:sldIdLst>
   <p:sldSz cx="9144000" cy="6858000" type="screen4x3"/>
@@ -125,7 +125,7 @@
   </p:defaultTextStyle>
   <p:extLst>
     <p:ext uri="{EFAFB233-063F-42B5-8137-9DF3F51BA10A}">
-      <p15:sldGuideLst xmlns:p15="http://schemas.microsoft.com/office/powerpoint/2012/main">
+      <p15:sldGuideLst xmlns:p15="http://schemas.microsoft.com/office/powerpoint/2012/main" xmlns="">
         <p15:guide id="1" orient="horz" pos="2160">
           <p15:clr>
             <a:srgbClr val="A4A3A4"/>
@@ -4189,7 +4189,7 @@
           <a:p>
             <a:r>
               <a:rPr lang="en-US" dirty="0" smtClean="0"/>
-              <a:t>Plans For Next Sprint</a:t>
+              <a:t>Q&amp;A</a:t>
             </a:r>
             <a:endParaRPr lang="en-US" dirty="0"/>
           </a:p>
@@ -4210,14 +4210,14 @@
           <a:bodyPr/>
           <a:lstStyle/>
           <a:p>
-            <a:endParaRPr lang="en-US"/>
+            <a:endParaRPr lang="en-US" dirty="0"/>
           </a:p>
         </p:txBody>
       </p:sp>
     </p:spTree>
     <p:extLst>
       <p:ext uri="{BB962C8B-B14F-4D97-AF65-F5344CB8AC3E}">
-        <p14:creationId xmlns:p14="http://schemas.microsoft.com/office/powerpoint/2010/main" val="3576051083"/>
+        <p14:creationId xmlns:p14="http://schemas.microsoft.com/office/powerpoint/2010/main" val="1720258891"/>
       </p:ext>
     </p:extLst>
   </p:cSld>
@@ -4268,7 +4268,7 @@
           <a:p>
             <a:r>
               <a:rPr lang="en-US" dirty="0" smtClean="0"/>
-              <a:t>Plans for next sprint</a:t>
+              <a:t>Plans For Next Sprint</a:t>
             </a:r>
             <a:endParaRPr lang="en-US" dirty="0"/>
           </a:p>
@@ -4276,38 +4276,27 @@
       </p:sp>
       <p:sp>
         <p:nvSpPr>
-          <p:cNvPr id="3" name="Content Placeholder 2"/>
-          <p:cNvSpPr>
-            <a:spLocks noGrp="1"/>
-          </p:cNvSpPr>
-          <p:nvPr>
-            <p:ph sz="quarter" idx="13"/>
+          <p:cNvPr id="3" name="Text Placeholder 2"/>
+          <p:cNvSpPr>
+            <a:spLocks noGrp="1"/>
+          </p:cNvSpPr>
+          <p:nvPr>
+            <p:ph type="body" idx="1"/>
           </p:nvPr>
         </p:nvSpPr>
         <p:spPr/>
         <p:txBody>
-          <a:bodyPr>
-            <a:normAutofit/>
-          </a:bodyPr>
-          <a:lstStyle/>
-          <a:p>
-            <a:r>
-              <a:rPr lang="en-US" sz="2400" dirty="0" smtClean="0"/>
-              <a:t>Developing the necessary components to network users of the application to play a game of chess.</a:t>
-            </a:r>
-          </a:p>
-          <a:p>
-            <a:r>
-              <a:rPr lang="en-US" sz="2400" dirty="0" smtClean="0"/>
-              <a:t>Implementing game pools, which are essentially queues for specific types of chess games.  The pools we will include are 1 minute games, 5 minute games, and 30 minute games.</a:t>
-            </a:r>
+          <a:bodyPr/>
+          <a:lstStyle/>
+          <a:p>
+            <a:endParaRPr lang="en-US"/>
           </a:p>
         </p:txBody>
       </p:sp>
     </p:spTree>
     <p:extLst>
       <p:ext uri="{BB962C8B-B14F-4D97-AF65-F5344CB8AC3E}">
-        <p14:creationId xmlns:p14="http://schemas.microsoft.com/office/powerpoint/2010/main" val="3994044668"/>
+        <p14:creationId xmlns:p14="http://schemas.microsoft.com/office/powerpoint/2010/main" val="3576051083"/>
       </p:ext>
     </p:extLst>
   </p:cSld>
@@ -4358,7 +4347,7 @@
           <a:p>
             <a:r>
               <a:rPr lang="en-US" dirty="0" smtClean="0"/>
-              <a:t>Q&amp;A</a:t>
+              <a:t>Plans for next sprint</a:t>
             </a:r>
             <a:endParaRPr lang="en-US" dirty="0"/>
           </a:p>
@@ -4366,27 +4355,38 @@
       </p:sp>
       <p:sp>
         <p:nvSpPr>
-          <p:cNvPr id="3" name="Text Placeholder 2"/>
-          <p:cNvSpPr>
-            <a:spLocks noGrp="1"/>
-          </p:cNvSpPr>
-          <p:nvPr>
-            <p:ph type="body" idx="1"/>
+          <p:cNvPr id="3" name="Content Placeholder 2"/>
+          <p:cNvSpPr>
+            <a:spLocks noGrp="1"/>
+          </p:cNvSpPr>
+          <p:nvPr>
+            <p:ph sz="quarter" idx="13"/>
           </p:nvPr>
         </p:nvSpPr>
         <p:spPr/>
         <p:txBody>
-          <a:bodyPr/>
-          <a:lstStyle/>
-          <a:p>
-            <a:endParaRPr lang="en-US" dirty="0"/>
+          <a:bodyPr>
+            <a:normAutofit/>
+          </a:bodyPr>
+          <a:lstStyle/>
+          <a:p>
+            <a:r>
+              <a:rPr lang="en-US" sz="2400" dirty="0" smtClean="0"/>
+              <a:t>Developing the necessary components to network users of the application to play a game of chess.</a:t>
+            </a:r>
+          </a:p>
+          <a:p>
+            <a:r>
+              <a:rPr lang="en-US" sz="2400" dirty="0" smtClean="0"/>
+              <a:t>Implementing game pools, which are essentially queues for specific types of chess games.  The pools we will include are 1 minute games, 5 minute games, and 30 minute games.</a:t>
+            </a:r>
           </a:p>
         </p:txBody>
       </p:sp>
     </p:spTree>
     <p:extLst>
       <p:ext uri="{BB962C8B-B14F-4D97-AF65-F5344CB8AC3E}">
-        <p14:creationId xmlns:p14="http://schemas.microsoft.com/office/powerpoint/2010/main" val="1720258891"/>
+        <p14:creationId xmlns:p14="http://schemas.microsoft.com/office/powerpoint/2010/main" val="3994044668"/>
       </p:ext>
     </p:extLst>
   </p:cSld>
@@ -4629,6 +4629,12 @@
           <a:lstStyle/>
           <a:p>
             <a:r>
+              <a:rPr lang="en-US" sz="2400" dirty="0"/>
+              <a:t>Demonstration of Application</a:t>
+            </a:r>
+          </a:p>
+          <a:p>
+            <a:r>
               <a:rPr lang="en-US" sz="2400" dirty="0" smtClean="0"/>
               <a:t>Q&amp;A</a:t>
             </a:r>
@@ -4637,21 +4643,11 @@
           <a:p>
             <a:r>
               <a:rPr lang="en-US" sz="2400" dirty="0" smtClean="0"/>
-              <a:t>Demonstration </a:t>
-            </a:r>
-            <a:r>
-              <a:rPr lang="en-US" sz="2400" dirty="0"/>
-              <a:t>of </a:t>
+              <a:t>Plans </a:t>
             </a:r>
             <a:r>
               <a:rPr lang="en-US" sz="2400" dirty="0" smtClean="0"/>
-              <a:t>Application</a:t>
-            </a:r>
-          </a:p>
-          <a:p>
-            <a:r>
-              <a:rPr lang="en-US" sz="2400" dirty="0" smtClean="0"/>
-              <a:t>Plans For Next Sprint</a:t>
+              <a:t>For Next Sprint</a:t>
             </a:r>
           </a:p>
         </p:txBody>

</xml_diff>